<commit_message>
Brought this back to working on UnityGLTF rather than MRTK GLTF - still needs to fix the progress ring again though
</commit_message>
<xml_diff>
--- a/IconAssets/IconAssets.pptx
+++ b/IconAssets/IconAssets.pptx
@@ -104,6 +104,11 @@
       </a:defRPr>
     </a:lvl9pPr>
   </p:defaultTextStyle>
+  <p:extLst>
+    <p:ext uri="{EFAFB233-063F-42B5-8137-9DF3F51BA10A}">
+      <p15:sldGuideLst xmlns:p15="http://schemas.microsoft.com/office/powerpoint/2012/main"/>
+    </p:ext>
+  </p:extLst>
 </p:presentation>
 </file>
 
@@ -256,7 +261,7 @@
           <a:p>
             <a:fld id="{EC204A19-EF9E-41BD-96FB-4DCC0AD93570}" type="datetimeFigureOut">
               <a:rPr lang="en-GB" smtClean="0"/>
-              <a:t>06/11/2018</a:t>
+              <a:t>09/11/2018</a:t>
             </a:fld>
             <a:endParaRPr lang="en-GB"/>
           </a:p>
@@ -456,7 +461,7 @@
           <a:p>
             <a:fld id="{EC204A19-EF9E-41BD-96FB-4DCC0AD93570}" type="datetimeFigureOut">
               <a:rPr lang="en-GB" smtClean="0"/>
-              <a:t>06/11/2018</a:t>
+              <a:t>09/11/2018</a:t>
             </a:fld>
             <a:endParaRPr lang="en-GB"/>
           </a:p>
@@ -666,7 +671,7 @@
           <a:p>
             <a:fld id="{EC204A19-EF9E-41BD-96FB-4DCC0AD93570}" type="datetimeFigureOut">
               <a:rPr lang="en-GB" smtClean="0"/>
-              <a:t>06/11/2018</a:t>
+              <a:t>09/11/2018</a:t>
             </a:fld>
             <a:endParaRPr lang="en-GB"/>
           </a:p>
@@ -866,7 +871,7 @@
           <a:p>
             <a:fld id="{EC204A19-EF9E-41BD-96FB-4DCC0AD93570}" type="datetimeFigureOut">
               <a:rPr lang="en-GB" smtClean="0"/>
-              <a:t>06/11/2018</a:t>
+              <a:t>09/11/2018</a:t>
             </a:fld>
             <a:endParaRPr lang="en-GB"/>
           </a:p>
@@ -1142,7 +1147,7 @@
           <a:p>
             <a:fld id="{EC204A19-EF9E-41BD-96FB-4DCC0AD93570}" type="datetimeFigureOut">
               <a:rPr lang="en-GB" smtClean="0"/>
-              <a:t>06/11/2018</a:t>
+              <a:t>09/11/2018</a:t>
             </a:fld>
             <a:endParaRPr lang="en-GB"/>
           </a:p>
@@ -1410,7 +1415,7 @@
           <a:p>
             <a:fld id="{EC204A19-EF9E-41BD-96FB-4DCC0AD93570}" type="datetimeFigureOut">
               <a:rPr lang="en-GB" smtClean="0"/>
-              <a:t>06/11/2018</a:t>
+              <a:t>09/11/2018</a:t>
             </a:fld>
             <a:endParaRPr lang="en-GB"/>
           </a:p>
@@ -1825,7 +1830,7 @@
           <a:p>
             <a:fld id="{EC204A19-EF9E-41BD-96FB-4DCC0AD93570}" type="datetimeFigureOut">
               <a:rPr lang="en-GB" smtClean="0"/>
-              <a:t>06/11/2018</a:t>
+              <a:t>09/11/2018</a:t>
             </a:fld>
             <a:endParaRPr lang="en-GB"/>
           </a:p>
@@ -1967,7 +1972,7 @@
           <a:p>
             <a:fld id="{EC204A19-EF9E-41BD-96FB-4DCC0AD93570}" type="datetimeFigureOut">
               <a:rPr lang="en-GB" smtClean="0"/>
-              <a:t>06/11/2018</a:t>
+              <a:t>09/11/2018</a:t>
             </a:fld>
             <a:endParaRPr lang="en-GB"/>
           </a:p>
@@ -2080,7 +2085,7 @@
           <a:p>
             <a:fld id="{EC204A19-EF9E-41BD-96FB-4DCC0AD93570}" type="datetimeFigureOut">
               <a:rPr lang="en-GB" smtClean="0"/>
-              <a:t>06/11/2018</a:t>
+              <a:t>09/11/2018</a:t>
             </a:fld>
             <a:endParaRPr lang="en-GB"/>
           </a:p>
@@ -2393,7 +2398,7 @@
           <a:p>
             <a:fld id="{EC204A19-EF9E-41BD-96FB-4DCC0AD93570}" type="datetimeFigureOut">
               <a:rPr lang="en-GB" smtClean="0"/>
-              <a:t>06/11/2018</a:t>
+              <a:t>09/11/2018</a:t>
             </a:fld>
             <a:endParaRPr lang="en-GB"/>
           </a:p>
@@ -2682,7 +2687,7 @@
           <a:p>
             <a:fld id="{EC204A19-EF9E-41BD-96FB-4DCC0AD93570}" type="datetimeFigureOut">
               <a:rPr lang="en-GB" smtClean="0"/>
-              <a:t>06/11/2018</a:t>
+              <a:t>09/11/2018</a:t>
             </a:fld>
             <a:endParaRPr lang="en-GB"/>
           </a:p>
@@ -2925,7 +2930,7 @@
           <a:p>
             <a:fld id="{EC204A19-EF9E-41BD-96FB-4DCC0AD93570}" type="datetimeFigureOut">
               <a:rPr lang="en-GB" smtClean="0"/>
-              <a:t>06/11/2018</a:t>
+              <a:t>09/11/2018</a:t>
             </a:fld>
             <a:endParaRPr lang="en-GB"/>
           </a:p>
@@ -3644,8 +3649,8 @@
         </p:nvSpPr>
         <p:spPr>
           <a:xfrm>
-            <a:off x="5237367" y="5968235"/>
-            <a:ext cx="1717265" cy="461665"/>
+            <a:off x="4755325" y="5968235"/>
+            <a:ext cx="2449838" cy="461665"/>
           </a:xfrm>
           <a:prstGeom prst="rect">
             <a:avLst/>
@@ -3666,7 +3671,7 @@
                 <a:latin typeface="Segoe UI" panose="020B0502040204020203" pitchFamily="34" charset="0"/>
                 <a:cs typeface="Segoe UI" panose="020B0502040204020203" pitchFamily="34" charset="0"/>
               </a:rPr>
-              <a:t>GLB Viewer</a:t>
+              <a:t>HoloLens Viewer</a:t>
             </a:r>
             <a:endParaRPr lang="en-GB" sz="2400" dirty="0">
               <a:solidFill>
@@ -4016,8 +4021,8 @@
           </p:nvSpPr>
           <p:spPr>
             <a:xfrm>
-              <a:off x="-3151180" y="-420511"/>
-              <a:ext cx="1322875" cy="333027"/>
+              <a:off x="-3453516" y="-420511"/>
+              <a:ext cx="1927546" cy="333027"/>
             </a:xfrm>
             <a:prstGeom prst="rect">
               <a:avLst/>
@@ -4039,7 +4044,7 @@
                   <a:latin typeface="Segoe UI" panose="020B0502040204020203" pitchFamily="34" charset="0"/>
                   <a:cs typeface="Segoe UI" panose="020B0502040204020203" pitchFamily="34" charset="0"/>
                 </a:rPr>
-                <a:t>GLB Viewer</a:t>
+                <a:t>HoloLens Viewer</a:t>
               </a:r>
               <a:endParaRPr lang="en-GB" sz="6600" dirty="0">
                 <a:solidFill>
@@ -4103,8 +4108,8 @@
         </p:nvSpPr>
         <p:spPr>
           <a:xfrm>
-            <a:off x="20008678" y="8223545"/>
-            <a:ext cx="4401270" cy="1107997"/>
+            <a:off x="19002793" y="8223545"/>
+            <a:ext cx="6413039" cy="1107996"/>
           </a:xfrm>
           <a:prstGeom prst="rect">
             <a:avLst/>
@@ -4126,7 +4131,7 @@
                 <a:latin typeface="Segoe UI" panose="020B0502040204020203" pitchFamily="34" charset="0"/>
                 <a:cs typeface="Segoe UI" panose="020B0502040204020203" pitchFamily="34" charset="0"/>
               </a:rPr>
-              <a:t>GLB Viewer</a:t>
+              <a:t>HoloLens Viewer</a:t>
             </a:r>
             <a:endParaRPr lang="en-GB" sz="6600" dirty="0">
               <a:solidFill>

</xml_diff>